<commit_message>
PPT geupdate + barchartcomparison gemaakt
</commit_message>
<xml_diff>
--- a/documentatie/Amstelhaege.pptx
+++ b/documentatie/Amstelhaege.pptx
@@ -22,7 +22,8 @@
     <p:sldId id="269" r:id="rId16"/>
     <p:sldId id="272" r:id="rId17"/>
     <p:sldId id="273" r:id="rId18"/>
-    <p:sldId id="274" r:id="rId19"/>
+    <p:sldId id="275" r:id="rId19"/>
+    <p:sldId id="274" r:id="rId20"/>
   </p:sldIdLst>
   <p:sldSz cx="12192000" cy="6858000"/>
   <p:notesSz cx="6858000" cy="9144000"/>
@@ -4246,35 +4247,139 @@
         </p:nvSpPr>
         <p:spPr/>
         <p:txBody>
-          <a:bodyPr/>
-          <a:lstStyle/>
-          <a:p>
-            <a:r>
-              <a:rPr lang="nl-NL" sz="6000" dirty="0" smtClean="0"/>
-              <a:t>Conclusie</a:t>
-            </a:r>
-            <a:endParaRPr lang="nl-NL" sz="6000" dirty="0"/>
-          </a:p>
-        </p:txBody>
-      </p:sp>
-      <p:sp>
-        <p:nvSpPr>
-          <p:cNvPr id="3" name="Tijdelijke aanduiding voor inhoud 2"/>
-          <p:cNvSpPr>
-            <a:spLocks noGrp="1"/>
-          </p:cNvSpPr>
-          <p:nvPr>
-            <p:ph idx="1"/>
-          </p:nvPr>
-        </p:nvSpPr>
-        <p:spPr/>
-        <p:txBody>
           <a:bodyPr>
             <a:normAutofit/>
           </a:bodyPr>
           <a:lstStyle/>
           <a:p>
             <a:r>
+              <a:rPr lang="en-US" sz="6000" dirty="0" err="1" smtClean="0"/>
+              <a:t>Conclusie</a:t>
+            </a:r>
+            <a:endParaRPr lang="en-US" sz="6000" dirty="0"/>
+          </a:p>
+        </p:txBody>
+      </p:sp>
+      <p:sp>
+        <p:nvSpPr>
+          <p:cNvPr id="3" name="Tijdelijke aanduiding voor inhoud 2"/>
+          <p:cNvSpPr>
+            <a:spLocks noGrp="1"/>
+          </p:cNvSpPr>
+          <p:nvPr>
+            <p:ph idx="1"/>
+          </p:nvPr>
+        </p:nvSpPr>
+        <p:spPr/>
+        <p:txBody>
+          <a:bodyPr/>
+          <a:lstStyle/>
+          <a:p>
+            <a:endParaRPr lang="en-US"/>
+          </a:p>
+        </p:txBody>
+      </p:sp>
+      <p:pic>
+        <p:nvPicPr>
+          <p:cNvPr id="4" name="Afbeelding 3"/>
+          <p:cNvPicPr>
+            <a:picLocks noChangeAspect="1"/>
+          </p:cNvPicPr>
+          <p:nvPr/>
+        </p:nvPicPr>
+        <p:blipFill>
+          <a:blip r:embed="rId2" cstate="print">
+            <a:extLst>
+              <a:ext uri="{28A0092B-C50C-407E-A947-70E740481C1C}">
+                <a14:useLocalDpi xmlns:a14="http://schemas.microsoft.com/office/drawing/2010/main" val="0"/>
+              </a:ext>
+            </a:extLst>
+          </a:blip>
+          <a:stretch>
+            <a:fillRect/>
+          </a:stretch>
+        </p:blipFill>
+        <p:spPr>
+          <a:xfrm>
+            <a:off x="2843777" y="1360196"/>
+            <a:ext cx="6504445" cy="5282195"/>
+          </a:xfrm>
+          <a:prstGeom prst="rect">
+            <a:avLst/>
+          </a:prstGeom>
+        </p:spPr>
+      </p:pic>
+    </p:spTree>
+    <p:extLst>
+      <p:ext uri="{BB962C8B-B14F-4D97-AF65-F5344CB8AC3E}">
+        <p14:creationId xmlns:p14="http://schemas.microsoft.com/office/powerpoint/2010/main" val="81078657"/>
+      </p:ext>
+    </p:extLst>
+  </p:cSld>
+  <p:clrMapOvr>
+    <a:masterClrMapping/>
+  </p:clrMapOvr>
+</p:sld>
+</file>
+
+<file path=ppt/slides/slide19.xml><?xml version="1.0" encoding="utf-8"?>
+<p:sld xmlns:a="http://schemas.openxmlformats.org/drawingml/2006/main" xmlns:r="http://schemas.openxmlformats.org/officeDocument/2006/relationships" xmlns:p="http://schemas.openxmlformats.org/presentationml/2006/main">
+  <p:cSld>
+    <p:spTree>
+      <p:nvGrpSpPr>
+        <p:cNvPr id="1" name=""/>
+        <p:cNvGrpSpPr/>
+        <p:nvPr/>
+      </p:nvGrpSpPr>
+      <p:grpSpPr>
+        <a:xfrm>
+          <a:off x="0" y="0"/>
+          <a:ext cx="0" cy="0"/>
+          <a:chOff x="0" y="0"/>
+          <a:chExt cx="0" cy="0"/>
+        </a:xfrm>
+      </p:grpSpPr>
+      <p:sp>
+        <p:nvSpPr>
+          <p:cNvPr id="2" name="Titel 1"/>
+          <p:cNvSpPr>
+            <a:spLocks noGrp="1"/>
+          </p:cNvSpPr>
+          <p:nvPr>
+            <p:ph type="title"/>
+          </p:nvPr>
+        </p:nvSpPr>
+        <p:spPr/>
+        <p:txBody>
+          <a:bodyPr/>
+          <a:lstStyle/>
+          <a:p>
+            <a:r>
+              <a:rPr lang="nl-NL" sz="6000" dirty="0" smtClean="0"/>
+              <a:t>Conclusie</a:t>
+            </a:r>
+            <a:endParaRPr lang="nl-NL" sz="6000" dirty="0"/>
+          </a:p>
+        </p:txBody>
+      </p:sp>
+      <p:sp>
+        <p:nvSpPr>
+          <p:cNvPr id="3" name="Tijdelijke aanduiding voor inhoud 2"/>
+          <p:cNvSpPr>
+            <a:spLocks noGrp="1"/>
+          </p:cNvSpPr>
+          <p:nvPr>
+            <p:ph idx="1"/>
+          </p:nvPr>
+        </p:nvSpPr>
+        <p:spPr/>
+        <p:txBody>
+          <a:bodyPr>
+            <a:normAutofit/>
+          </a:bodyPr>
+          <a:lstStyle/>
+          <a:p>
+            <a:r>
               <a:rPr lang="nl-NL" sz="3600" dirty="0" smtClean="0"/>
               <a:t>Schuiven-</a:t>
             </a:r>
@@ -4298,7 +4403,21 @@
             </a:r>
             <a:r>
               <a:rPr lang="nl-NL" sz="3600" dirty="0" smtClean="0"/>
-              <a:t> blijkt, zijn de andere algoritmes daarmee niet meteen ‘slechter’</a:t>
+              <a:t> blijkt, zijn de andere algoritmes daarmee niet meteen ‘slechter</a:t>
+            </a:r>
+            <a:r>
+              <a:rPr lang="nl-NL" sz="3600" dirty="0" smtClean="0"/>
+              <a:t>’</a:t>
+            </a:r>
+          </a:p>
+          <a:p>
+            <a:r>
+              <a:rPr lang="nl-NL" sz="3600" dirty="0" smtClean="0"/>
+              <a:t>Enkele uitkomst is niet representatief voor </a:t>
+            </a:r>
+            <a:r>
+              <a:rPr lang="nl-NL" sz="3600" smtClean="0"/>
+              <a:t>een algoritme</a:t>
             </a:r>
             <a:endParaRPr lang="nl-NL" sz="3600" dirty="0"/>
           </a:p>

</xml_diff>